<commit_message>
Modified additional exercises in presentation
</commit_message>
<xml_diff>
--- a/Introduction_to_Linux.pptx
+++ b/Introduction_to_Linux.pptx
@@ -23436,14 +23436,18 @@
           </a:bodyPr>
           <a:lstStyle/>
           <a:p>
-            <a:pPr indent="0" lvl="0" marL="0" rtl="0" algn="l">
-              <a:spcBef>
-                <a:spcPts val="0"/>
-              </a:spcBef>
-              <a:spcAft>
-                <a:spcPts val="0"/>
-              </a:spcAft>
-              <a:buNone/>
+            <a:pPr indent="-342900" lvl="0" marL="457200" rtl="0" algn="l">
+              <a:spcBef>
+                <a:spcPts val="0"/>
+              </a:spcBef>
+              <a:spcAft>
+                <a:spcPts val="0"/>
+              </a:spcAft>
+              <a:buClr>
+                <a:srgbClr val="000000"/>
+              </a:buClr>
+              <a:buSzPts val="1800"/>
+              <a:buAutoNum type="arabicPeriod"/>
             </a:pPr>
             <a:r>
               <a:rPr lang="es">
@@ -23460,14 +23464,18 @@
             </a:endParaRPr>
           </a:p>
           <a:p>
-            <a:pPr indent="0" lvl="0" marL="0" rtl="0" algn="l">
-              <a:spcBef>
-                <a:spcPts val="1600"/>
-              </a:spcBef>
-              <a:spcAft>
-                <a:spcPts val="0"/>
-              </a:spcAft>
-              <a:buNone/>
+            <a:pPr indent="-342900" lvl="0" marL="457200" rtl="0" algn="l">
+              <a:spcBef>
+                <a:spcPts val="0"/>
+              </a:spcBef>
+              <a:spcAft>
+                <a:spcPts val="0"/>
+              </a:spcAft>
+              <a:buClr>
+                <a:srgbClr val="000000"/>
+              </a:buClr>
+              <a:buSzPts val="1800"/>
+              <a:buAutoNum type="arabicPeriod"/>
             </a:pPr>
             <a:r>
               <a:rPr lang="es">
@@ -23484,14 +23492,18 @@
             </a:endParaRPr>
           </a:p>
           <a:p>
-            <a:pPr indent="0" lvl="0" marL="0" rtl="0" algn="l">
-              <a:spcBef>
-                <a:spcPts val="1600"/>
-              </a:spcBef>
-              <a:spcAft>
-                <a:spcPts val="0"/>
-              </a:spcAft>
-              <a:buNone/>
+            <a:pPr indent="-342900" lvl="0" marL="457200" rtl="0" algn="l">
+              <a:spcBef>
+                <a:spcPts val="0"/>
+              </a:spcBef>
+              <a:spcAft>
+                <a:spcPts val="0"/>
+              </a:spcAft>
+              <a:buClr>
+                <a:srgbClr val="000000"/>
+              </a:buClr>
+              <a:buSzPts val="1800"/>
+              <a:buAutoNum type="arabicPeriod"/>
             </a:pPr>
             <a:r>
               <a:rPr lang="es">
@@ -23508,19 +23520,18 @@
             </a:endParaRPr>
           </a:p>
           <a:p>
-            <a:pPr indent="0" lvl="0" marL="0" rtl="0" algn="l">
-              <a:spcBef>
-                <a:spcPts val="1600"/>
+            <a:pPr indent="-342900" lvl="0" marL="457200" rtl="0" algn="l">
+              <a:spcBef>
+                <a:spcPts val="0"/>
               </a:spcBef>
               <a:spcAft>
                 <a:spcPts val="0"/>
               </a:spcAft>
               <a:buClr>
-                <a:schemeClr val="dk1"/>
+                <a:srgbClr val="000000"/>
               </a:buClr>
-              <a:buSzPts val="1100"/>
-              <a:buFont typeface="Arial"/>
-              <a:buNone/>
+              <a:buSzPts val="1800"/>
+              <a:buAutoNum type="arabicPeriod"/>
             </a:pPr>
             <a:r>
               <a:rPr lang="es">
@@ -23537,19 +23548,18 @@
             </a:endParaRPr>
           </a:p>
           <a:p>
-            <a:pPr indent="0" lvl="0" marL="0" rtl="0" algn="l">
-              <a:spcBef>
-                <a:spcPts val="1600"/>
+            <a:pPr indent="-342900" lvl="0" marL="457200" rtl="0" algn="l">
+              <a:spcBef>
+                <a:spcPts val="0"/>
               </a:spcBef>
               <a:spcAft>
                 <a:spcPts val="0"/>
               </a:spcAft>
               <a:buClr>
-                <a:schemeClr val="dk1"/>
+                <a:srgbClr val="000000"/>
               </a:buClr>
-              <a:buSzPts val="1100"/>
-              <a:buFont typeface="Arial"/>
-              <a:buNone/>
+              <a:buSzPts val="1800"/>
+              <a:buAutoNum type="arabicPeriod"/>
             </a:pPr>
             <a:r>
               <a:rPr lang="es">
@@ -23566,19 +23576,18 @@
             </a:endParaRPr>
           </a:p>
           <a:p>
-            <a:pPr indent="0" lvl="0" marL="0" rtl="0" algn="l">
-              <a:spcBef>
-                <a:spcPts val="1600"/>
-              </a:spcBef>
-              <a:spcAft>
-                <a:spcPts val="1600"/>
+            <a:pPr indent="-342900" lvl="0" marL="457200" rtl="0" algn="l">
+              <a:spcBef>
+                <a:spcPts val="0"/>
+              </a:spcBef>
+              <a:spcAft>
+                <a:spcPts val="0"/>
               </a:spcAft>
               <a:buClr>
-                <a:schemeClr val="dk1"/>
+                <a:srgbClr val="000000"/>
               </a:buClr>
-              <a:buSzPts val="1100"/>
-              <a:buFont typeface="Arial"/>
-              <a:buNone/>
+              <a:buSzPts val="1800"/>
+              <a:buAutoNum type="arabicPeriod"/>
             </a:pPr>
             <a:r>
               <a:rPr lang="es">
@@ -23684,7 +23693,7 @@
           </a:bodyPr>
           <a:lstStyle/>
           <a:p>
-            <a:pPr indent="0" lvl="0" marL="0" rtl="0" algn="l">
+            <a:pPr indent="-342900" lvl="0" marL="457200" rtl="0" algn="l">
               <a:spcBef>
                 <a:spcPts val="0"/>
               </a:spcBef>
@@ -23692,11 +23701,10 @@
                 <a:spcPts val="0"/>
               </a:spcAft>
               <a:buClr>
-                <a:schemeClr val="dk1"/>
+                <a:srgbClr val="000000"/>
               </a:buClr>
-              <a:buSzPts val="1100"/>
-              <a:buFont typeface="Arial"/>
-              <a:buNone/>
+              <a:buSzPts val="1800"/>
+              <a:buAutoNum type="arabicPeriod"/>
             </a:pPr>
             <a:r>
               <a:rPr lang="es">
@@ -23704,7 +23712,7 @@
                   <a:srgbClr val="000000"/>
                 </a:solidFill>
               </a:rPr>
-              <a:t>Print differences between file1.tsv and file2.tsv</a:t>
+              <a:t>How many genes are in file1.tsv? and in file2.tsv?</a:t>
             </a:r>
             <a:endParaRPr>
               <a:solidFill>
@@ -23713,19 +23721,18 @@
             </a:endParaRPr>
           </a:p>
           <a:p>
-            <a:pPr indent="0" lvl="0" marL="0" rtl="0" algn="l">
-              <a:spcBef>
-                <a:spcPts val="1600"/>
+            <a:pPr indent="-342900" lvl="0" marL="457200" rtl="0" algn="l">
+              <a:spcBef>
+                <a:spcPts val="0"/>
               </a:spcBef>
               <a:spcAft>
                 <a:spcPts val="0"/>
               </a:spcAft>
               <a:buClr>
-                <a:schemeClr val="dk1"/>
+                <a:srgbClr val="000000"/>
               </a:buClr>
-              <a:buSzPts val="1100"/>
-              <a:buFont typeface="Arial"/>
-              <a:buNone/>
+              <a:buSzPts val="1800"/>
+              <a:buAutoNum type="arabicPeriod"/>
             </a:pPr>
             <a:r>
               <a:rPr lang="es">
@@ -23733,7 +23740,7 @@
                   <a:srgbClr val="000000"/>
                 </a:solidFill>
               </a:rPr>
-              <a:t>How many genes are in file1.tsv? and in file2.tsv?</a:t>
+              <a:t>Which file has more regions: file1.tsv or file2.tsv?</a:t>
             </a:r>
             <a:endParaRPr>
               <a:solidFill>
@@ -23742,19 +23749,18 @@
             </a:endParaRPr>
           </a:p>
           <a:p>
-            <a:pPr indent="0" lvl="0" marL="0" rtl="0" algn="l">
-              <a:spcBef>
-                <a:spcPts val="1600"/>
+            <a:pPr indent="-342900" lvl="0" marL="457200" rtl="0" algn="l">
+              <a:spcBef>
+                <a:spcPts val="0"/>
               </a:spcBef>
               <a:spcAft>
                 <a:spcPts val="0"/>
               </a:spcAft>
               <a:buClr>
-                <a:schemeClr val="dk1"/>
+                <a:srgbClr val="000000"/>
               </a:buClr>
-              <a:buSzPts val="1100"/>
-              <a:buFont typeface="Arial"/>
-              <a:buNone/>
+              <a:buSzPts val="1800"/>
+              <a:buAutoNum type="arabicPeriod"/>
             </a:pPr>
             <a:r>
               <a:rPr lang="es">
@@ -23762,7 +23768,7 @@
                   <a:srgbClr val="000000"/>
                 </a:solidFill>
               </a:rPr>
-              <a:t>Which file has more regions: file1.tsv or file2.tsv?</a:t>
+              <a:t>Which file is bigger (occupies more bytes): file1.tsv or file2.tsv?</a:t>
             </a:r>
             <a:endParaRPr>
               <a:solidFill>
@@ -23771,19 +23777,18 @@
             </a:endParaRPr>
           </a:p>
           <a:p>
-            <a:pPr indent="0" lvl="0" marL="0" rtl="0" algn="l">
-              <a:spcBef>
-                <a:spcPts val="1600"/>
+            <a:pPr indent="-342900" lvl="0" marL="457200" rtl="0" algn="l">
+              <a:spcBef>
+                <a:spcPts val="0"/>
               </a:spcBef>
               <a:spcAft>
                 <a:spcPts val="0"/>
               </a:spcAft>
               <a:buClr>
-                <a:schemeClr val="dk1"/>
+                <a:srgbClr val="000000"/>
               </a:buClr>
-              <a:buSzPts val="1100"/>
-              <a:buFont typeface="Arial"/>
-              <a:buNone/>
+              <a:buSzPts val="1800"/>
+              <a:buAutoNum type="arabicPeriod"/>
             </a:pPr>
             <a:r>
               <a:rPr lang="es">
@@ -23791,7 +23796,7 @@
                   <a:srgbClr val="000000"/>
                 </a:solidFill>
               </a:rPr>
-              <a:t>Which file is bigger (occupies more bytes): file1.tsv or file2.tsv?</a:t>
+              <a:t>Find regions regions in common in both files</a:t>
             </a:r>
             <a:endParaRPr>
               <a:solidFill>
@@ -23800,48 +23805,18 @@
             </a:endParaRPr>
           </a:p>
           <a:p>
-            <a:pPr indent="0" lvl="0" marL="0" rtl="0" algn="l">
-              <a:spcBef>
-                <a:spcPts val="1600"/>
+            <a:pPr indent="-342900" lvl="0" marL="457200" rtl="0" algn="l">
+              <a:spcBef>
+                <a:spcPts val="0"/>
               </a:spcBef>
               <a:spcAft>
                 <a:spcPts val="0"/>
               </a:spcAft>
               <a:buClr>
-                <a:schemeClr val="dk1"/>
+                <a:srgbClr val="000000"/>
               </a:buClr>
-              <a:buSzPts val="1100"/>
-              <a:buFont typeface="Arial"/>
-              <a:buNone/>
-            </a:pPr>
-            <a:r>
-              <a:rPr lang="es">
-                <a:solidFill>
-                  <a:srgbClr val="000000"/>
-                </a:solidFill>
-              </a:rPr>
-              <a:t>Find regions regions in common in both files</a:t>
-            </a:r>
-            <a:endParaRPr>
-              <a:solidFill>
-                <a:srgbClr val="000000"/>
-              </a:solidFill>
-            </a:endParaRPr>
-          </a:p>
-          <a:p>
-            <a:pPr indent="0" lvl="0" marL="0" rtl="0" algn="l">
-              <a:spcBef>
-                <a:spcPts val="1600"/>
-              </a:spcBef>
-              <a:spcAft>
-                <a:spcPts val="1600"/>
-              </a:spcAft>
-              <a:buClr>
-                <a:schemeClr val="dk1"/>
-              </a:buClr>
-              <a:buSzPts val="1100"/>
-              <a:buFont typeface="Arial"/>
-              <a:buNone/>
+              <a:buSzPts val="1800"/>
+              <a:buAutoNum type="arabicPeriod"/>
             </a:pPr>
             <a:r>
               <a:rPr lang="es">
@@ -23907,14 +23882,18 @@
           </a:bodyPr>
           <a:lstStyle/>
           <a:p>
-            <a:pPr indent="0" lvl="0" marL="0" rtl="0" algn="l">
-              <a:spcBef>
-                <a:spcPts val="0"/>
-              </a:spcBef>
-              <a:spcAft>
-                <a:spcPts val="0"/>
-              </a:spcAft>
-              <a:buNone/>
+            <a:pPr indent="-342900" lvl="0" marL="457200" rtl="0" algn="l">
+              <a:spcBef>
+                <a:spcPts val="0"/>
+              </a:spcBef>
+              <a:spcAft>
+                <a:spcPts val="0"/>
+              </a:spcAft>
+              <a:buClr>
+                <a:srgbClr val="000000"/>
+              </a:buClr>
+              <a:buSzPts val="1800"/>
+              <a:buAutoNum type="arabicPeriod"/>
             </a:pPr>
             <a:r>
               <a:rPr lang="es">
@@ -23931,14 +23910,18 @@
             </a:endParaRPr>
           </a:p>
           <a:p>
-            <a:pPr indent="0" lvl="0" marL="0" rtl="0" algn="l">
-              <a:spcBef>
-                <a:spcPts val="1600"/>
-              </a:spcBef>
-              <a:spcAft>
-                <a:spcPts val="0"/>
-              </a:spcAft>
-              <a:buNone/>
+            <a:pPr indent="-342900" lvl="0" marL="457200" rtl="0" algn="l">
+              <a:spcBef>
+                <a:spcPts val="0"/>
+              </a:spcBef>
+              <a:spcAft>
+                <a:spcPts val="0"/>
+              </a:spcAft>
+              <a:buClr>
+                <a:srgbClr val="000000"/>
+              </a:buClr>
+              <a:buSzPts val="1800"/>
+              <a:buAutoNum type="arabicPeriod"/>
             </a:pPr>
             <a:r>
               <a:rPr lang="es">
@@ -23955,14 +23938,18 @@
             </a:endParaRPr>
           </a:p>
           <a:p>
-            <a:pPr indent="0" lvl="0" marL="0" rtl="0" algn="l">
-              <a:spcBef>
-                <a:spcPts val="1600"/>
-              </a:spcBef>
-              <a:spcAft>
-                <a:spcPts val="1600"/>
-              </a:spcAft>
-              <a:buNone/>
+            <a:pPr indent="-342900" lvl="0" marL="457200" rtl="0" algn="l">
+              <a:spcBef>
+                <a:spcPts val="0"/>
+              </a:spcBef>
+              <a:spcAft>
+                <a:spcPts val="0"/>
+              </a:spcAft>
+              <a:buClr>
+                <a:srgbClr val="000000"/>
+              </a:buClr>
+              <a:buSzPts val="1800"/>
+              <a:buAutoNum type="arabicPeriod"/>
             </a:pPr>
             <a:r>
               <a:rPr lang="es">
@@ -23970,7 +23957,7 @@
                   <a:srgbClr val="000000"/>
                 </a:solidFill>
               </a:rPr>
-              <a:t>There is a typo in file2.tsv. Are you able to find it? (Trick: use sort + uniq)</a:t>
+              <a:t>There is a typo in a gene in file2.tsv. Are you able to find it? (Tip: use sort + uniq)</a:t>
             </a:r>
             <a:endParaRPr>
               <a:solidFill>

</xml_diff>